<commit_message>
Completed the basic tests for the engine to test execution and pushing data along the pipe to the end of the pipe.
</commit_message>
<xml_diff>
--- a/doc/Engine architecture.pptx
+++ b/doc/Engine architecture.pptx
@@ -5254,16 +5254,54 @@
           <a:p>
             <a:r>
               <a:rPr lang="en-US" sz="1000" dirty="0"/>
-              <a:t>Virtual broker plugin allows unlimited funds to enter positions based on the </a:t>
-            </a:r>
-            <a:r>
-              <a:rPr lang="en-US" sz="1000"/>
-              <a:t>event criteria.</a:t>
-            </a:r>
-            <a:endParaRPr lang="en-US" sz="1000" dirty="0"/>
-          </a:p>
-        </p:txBody>
-      </p:sp>
+              <a:t>Virtual broker plugin allows unlimited funds to enter positions based on the event criteria.</a:t>
+            </a:r>
+          </a:p>
+        </p:txBody>
+      </p:sp>
+      <p:cxnSp>
+        <p:nvCxnSpPr>
+          <p:cNvPr id="18" name="Straight Arrow Connector 17">
+            <a:extLst>
+              <a:ext uri="{FF2B5EF4-FFF2-40B4-BE49-F238E27FC236}">
+                <a16:creationId xmlns:a16="http://schemas.microsoft.com/office/drawing/2014/main" id="{4BE309CB-5A9E-67DB-D636-AC1FA2923E30}"/>
+              </a:ext>
+            </a:extLst>
+          </p:cNvPr>
+          <p:cNvCxnSpPr>
+            <a:cxnSpLocks/>
+            <a:stCxn id="16" idx="0"/>
+            <a:endCxn id="14" idx="2"/>
+          </p:cNvCxnSpPr>
+          <p:nvPr/>
+        </p:nvCxnSpPr>
+        <p:spPr>
+          <a:xfrm flipH="1" flipV="1">
+            <a:off x="9385284" y="2465963"/>
+            <a:ext cx="118018" cy="230427"/>
+          </a:xfrm>
+          <a:prstGeom prst="straightConnector1">
+            <a:avLst/>
+          </a:prstGeom>
+          <a:ln>
+            <a:tailEnd type="triangle"/>
+          </a:ln>
+        </p:spPr>
+        <p:style>
+          <a:lnRef idx="1">
+            <a:schemeClr val="accent1"/>
+          </a:lnRef>
+          <a:fillRef idx="0">
+            <a:schemeClr val="accent1"/>
+          </a:fillRef>
+          <a:effectRef idx="0">
+            <a:schemeClr val="accent1"/>
+          </a:effectRef>
+          <a:fontRef idx="minor">
+            <a:schemeClr val="tx1"/>
+          </a:fontRef>
+        </p:style>
+      </p:cxnSp>
     </p:spTree>
     <p:extLst>
       <p:ext uri="{BB962C8B-B14F-4D97-AF65-F5344CB8AC3E}">

</xml_diff>

<commit_message>
Basic components for the pipe and filter architecture to use for the different tools used to study and trade the market.
</commit_message>
<xml_diff>
--- a/doc/Engine architecture.pptx
+++ b/doc/Engine architecture.pptx
@@ -264,7 +264,7 @@
           <a:p>
             <a:fld id="{2A9A8CD7-C4FC-47D2-99DE-45AF1BBCA0C8}" type="datetimeFigureOut">
               <a:rPr lang="en-US" smtClean="0"/>
-              <a:t>9/3/2024</a:t>
+              <a:t>9/7/2024</a:t>
             </a:fld>
             <a:endParaRPr lang="en-US"/>
           </a:p>
@@ -462,7 +462,7 @@
           <a:p>
             <a:fld id="{2A9A8CD7-C4FC-47D2-99DE-45AF1BBCA0C8}" type="datetimeFigureOut">
               <a:rPr lang="en-US" smtClean="0"/>
-              <a:t>9/3/2024</a:t>
+              <a:t>9/7/2024</a:t>
             </a:fld>
             <a:endParaRPr lang="en-US"/>
           </a:p>
@@ -670,7 +670,7 @@
           <a:p>
             <a:fld id="{2A9A8CD7-C4FC-47D2-99DE-45AF1BBCA0C8}" type="datetimeFigureOut">
               <a:rPr lang="en-US" smtClean="0"/>
-              <a:t>9/3/2024</a:t>
+              <a:t>9/7/2024</a:t>
             </a:fld>
             <a:endParaRPr lang="en-US"/>
           </a:p>
@@ -868,7 +868,7 @@
           <a:p>
             <a:fld id="{2A9A8CD7-C4FC-47D2-99DE-45AF1BBCA0C8}" type="datetimeFigureOut">
               <a:rPr lang="en-US" smtClean="0"/>
-              <a:t>9/3/2024</a:t>
+              <a:t>9/7/2024</a:t>
             </a:fld>
             <a:endParaRPr lang="en-US"/>
           </a:p>
@@ -1143,7 +1143,7 @@
           <a:p>
             <a:fld id="{2A9A8CD7-C4FC-47D2-99DE-45AF1BBCA0C8}" type="datetimeFigureOut">
               <a:rPr lang="en-US" smtClean="0"/>
-              <a:t>9/3/2024</a:t>
+              <a:t>9/7/2024</a:t>
             </a:fld>
             <a:endParaRPr lang="en-US"/>
           </a:p>
@@ -1408,7 +1408,7 @@
           <a:p>
             <a:fld id="{2A9A8CD7-C4FC-47D2-99DE-45AF1BBCA0C8}" type="datetimeFigureOut">
               <a:rPr lang="en-US" smtClean="0"/>
-              <a:t>9/3/2024</a:t>
+              <a:t>9/7/2024</a:t>
             </a:fld>
             <a:endParaRPr lang="en-US"/>
           </a:p>
@@ -1820,7 +1820,7 @@
           <a:p>
             <a:fld id="{2A9A8CD7-C4FC-47D2-99DE-45AF1BBCA0C8}" type="datetimeFigureOut">
               <a:rPr lang="en-US" smtClean="0"/>
-              <a:t>9/3/2024</a:t>
+              <a:t>9/7/2024</a:t>
             </a:fld>
             <a:endParaRPr lang="en-US"/>
           </a:p>
@@ -1961,7 +1961,7 @@
           <a:p>
             <a:fld id="{2A9A8CD7-C4FC-47D2-99DE-45AF1BBCA0C8}" type="datetimeFigureOut">
               <a:rPr lang="en-US" smtClean="0"/>
-              <a:t>9/3/2024</a:t>
+              <a:t>9/7/2024</a:t>
             </a:fld>
             <a:endParaRPr lang="en-US"/>
           </a:p>
@@ -2074,7 +2074,7 @@
           <a:p>
             <a:fld id="{2A9A8CD7-C4FC-47D2-99DE-45AF1BBCA0C8}" type="datetimeFigureOut">
               <a:rPr lang="en-US" smtClean="0"/>
-              <a:t>9/3/2024</a:t>
+              <a:t>9/7/2024</a:t>
             </a:fld>
             <a:endParaRPr lang="en-US"/>
           </a:p>
@@ -2385,7 +2385,7 @@
           <a:p>
             <a:fld id="{2A9A8CD7-C4FC-47D2-99DE-45AF1BBCA0C8}" type="datetimeFigureOut">
               <a:rPr lang="en-US" smtClean="0"/>
-              <a:t>9/3/2024</a:t>
+              <a:t>9/7/2024</a:t>
             </a:fld>
             <a:endParaRPr lang="en-US"/>
           </a:p>
@@ -2673,7 +2673,7 @@
           <a:p>
             <a:fld id="{2A9A8CD7-C4FC-47D2-99DE-45AF1BBCA0C8}" type="datetimeFigureOut">
               <a:rPr lang="en-US" smtClean="0"/>
-              <a:t>9/3/2024</a:t>
+              <a:t>9/7/2024</a:t>
             </a:fld>
             <a:endParaRPr lang="en-US"/>
           </a:p>
@@ -2914,7 +2914,7 @@
           <a:p>
             <a:fld id="{2A9A8CD7-C4FC-47D2-99DE-45AF1BBCA0C8}" type="datetimeFigureOut">
               <a:rPr lang="en-US" smtClean="0"/>
-              <a:t>9/3/2024</a:t>
+              <a:t>9/7/2024</a:t>
             </a:fld>
             <a:endParaRPr lang="en-US"/>
           </a:p>

</xml_diff>